<commit_message>
Excel data input sample added. Common collections added for XSSF.
</commit_message>
<xml_diff>
--- a/SoftenReporterSamples/samples/result/Report-Result-fromJsonInput.pptx
+++ b/SoftenReporterSamples/samples/result/Report-Result-fromJsonInput.pptx
@@ -9,7 +9,7 @@
   </p:notesMasterIdLst>
   <p:sldIdLst>
     <p:sldId id="256" r:id="rId2"/>
-    <p:sldId id="259" r:id="rId12"/>
+    <p:sldId id="259" r:id="rId11"/>
     <p:sldId id="257" r:id="rId4"/>
   </p:sldIdLst>
   <p:sldSz cx="9906000" cy="6858000" type="A4"/>
@@ -129,10 +129,6 @@
 </p:cmAuthorLst>
 </file>
 
-<file path=ppt/revisionInfo.xml><?xml version="1.0" encoding="utf-8"?>
-<p1510:revInfo xmlns:a="http://schemas.openxmlformats.org/drawingml/2006/main" xmlns:r="http://schemas.openxmlformats.org/officeDocument/2006/relationships" xmlns:p1510="http://schemas.microsoft.com/office/powerpoint/2015/10/main"/>
-</file>
-
 <file path=ppt/comments/comment1.xml><?xml version="1.0" encoding="utf-8"?>
 <p:cmLst xmlns:a="http://schemas.openxmlformats.org/drawingml/2006/main" xmlns:r="http://schemas.openxmlformats.org/officeDocument/2006/relationships" xmlns:p="http://schemas.openxmlformats.org/presentationml/2006/main">
   <p:cm authorId="1" dt="2017-10-21T22:15:20.633" idx="2">
@@ -229,7 +225,7 @@
           <a:p>
             <a:fld id="{679F2550-7EBE-4707-8835-83DC8B8BE00B}" type="datetimeFigureOut">
               <a:rPr altLang="en-US" lang="ko-KR" smtClean="0"/>
-              <a:t>2017-12-16</a:t>
+              <a:t>2018-03-24</a:t>
             </a:fld>
             <a:endParaRPr altLang="en-US" lang="ko-KR"/>
           </a:p>
@@ -574,7 +570,7 @@
             <a:fld id="{C9601C4B-8A3B-4121-906D-78A789FC27A9}" type="datetime1">
               <a:rPr altLang="en-US" lang="ko-KR" smtClean="0"/>
               <a:pPr/>
-              <a:t>2017-12-16</a:t>
+              <a:t>2018-03-24</a:t>
             </a:fld>
             <a:endParaRPr altLang="en-US" dirty="0" lang="ko-KR"/>
           </a:p>
@@ -795,7 +791,7 @@
           <a:p>
             <a:fld id="{94CA0FD7-6851-4E17-ABE3-6B66498BEBE4}" type="datetime1">
               <a:rPr altLang="en-US" lang="ko-KR" smtClean="0"/>
-              <a:t>2017-12-16</a:t>
+              <a:t>2018-03-24</a:t>
             </a:fld>
             <a:endParaRPr altLang="en-US" dirty="0" lang="ko-KR"/>
           </a:p>
@@ -2450,7 +2446,7 @@
           <a:p>
             <a:fld id="{430B6D25-6BBB-4641-BD40-57C8E1527512}" type="datetime1">
               <a:rPr altLang="en-US" lang="ko-KR" smtClean="0"/>
-              <a:t>2017-12-16</a:t>
+              <a:t>2018-03-24</a:t>
             </a:fld>
             <a:endParaRPr altLang="en-US" dirty="0" lang="ko-KR"/>
           </a:p>
@@ -3620,7 +3616,7 @@
           <p:nvPr>
             <p:extLst>
               <p:ext uri="{D42A27DB-BD31-4B8C-83A1-F6EECF244321}">
-                <p14:modId xmlns:p14="http://schemas.microsoft.com/office/powerpoint/2010/main" val="63648391"/>
+                <p14:modId xmlns:p14="http://schemas.microsoft.com/office/powerpoint/2010/main" val="1346929652"/>
               </p:ext>
             </p:extLst>
           </p:nvPr>
@@ -4960,6 +4956,21 @@
                         <a:rPr altLang="ko-KR" dirty="0" err="1" lang="en-US" sz="1000"/>
                         <a:t>TEST CAD NAME 0</a:t>
                       </a:r>
+                    </a:p>
+                    <a:p>
+                      <a:pPr algn="l" latinLnBrk="1"/>
+                      <a:r>
+                        <a:rPr altLang="ko-KR" dirty="0" lang="en-US" sz="1000"/>
+                        <a:t>(</a:t>
+                      </a:r>
+                      <a:r>
+                        <a:rPr altLang="ko-KR" dirty="0" err="1" lang="en-US" sz="1000"/>
+                        <a:t>1234-5678-0</a:t>
+                      </a:r>
+                      <a:r>
+                        <a:rPr altLang="ko-KR" dirty="0" lang="en-US" sz="1000"/>
+                        <a:t>)</a:t>
+                      </a:r>
                       <a:endParaRPr altLang="en-US" dirty="0" lang="ko-KR" sz="1000"/>
                     </a:p>
                   </a:txBody>
@@ -5536,6 +5547,36 @@
                       </a:r>
                       <a:endParaRPr lang="en-US" sz="1100"/>
                     </a:p>
+                    <a:p>
+                      <a:pPr algn="l"/>
+                      <a:r>
+                        <a:rPr lang="en-US" sz="1000" b="false" i="false" u="none">
+                          <a:solidFill>
+                            <a:srgbClr val="000000"/>
+                          </a:solidFill>
+                          <a:latin typeface="맑은 고딕"/>
+                        </a:rPr>
+                        <a:t>(</a:t>
+                      </a:r>
+                      <a:r>
+                        <a:rPr lang="en-US" sz="1000" b="false" i="false" u="none">
+                          <a:solidFill>
+                            <a:srgbClr val="000000"/>
+                          </a:solidFill>
+                          <a:latin typeface="맑은 고딕"/>
+                        </a:rPr>
+                        <a:t>1234-5678-1</a:t>
+                      </a:r>
+                      <a:r>
+                        <a:rPr lang="en-US" sz="1000" b="false" i="false" u="none">
+                          <a:solidFill>
+                            <a:srgbClr val="000000"/>
+                          </a:solidFill>
+                          <a:latin typeface="맑은 고딕"/>
+                        </a:rPr>
+                        <a:t>)</a:t>
+                      </a:r>
+                    </a:p>
                   </a:txBody>
                   <a:tcPr anchor="ctr">
                     <a:lnL cmpd="sng" algn="ctr" cap="flat" w="3175">
@@ -6051,6 +6092,36 @@
                       </a:r>
                       <a:endParaRPr lang="en-US" sz="1100"/>
                     </a:p>
+                    <a:p>
+                      <a:pPr algn="l"/>
+                      <a:r>
+                        <a:rPr lang="en-US" sz="1000" b="false" i="false" u="none">
+                          <a:solidFill>
+                            <a:srgbClr val="000000"/>
+                          </a:solidFill>
+                          <a:latin typeface="맑은 고딕"/>
+                        </a:rPr>
+                        <a:t>(</a:t>
+                      </a:r>
+                      <a:r>
+                        <a:rPr lang="en-US" sz="1000" b="false" i="false" u="none">
+                          <a:solidFill>
+                            <a:srgbClr val="000000"/>
+                          </a:solidFill>
+                          <a:latin typeface="맑은 고딕"/>
+                        </a:rPr>
+                        <a:t>1234-5678-2</a:t>
+                      </a:r>
+                      <a:r>
+                        <a:rPr lang="en-US" sz="1000" b="false" i="false" u="none">
+                          <a:solidFill>
+                            <a:srgbClr val="000000"/>
+                          </a:solidFill>
+                          <a:latin typeface="맑은 고딕"/>
+                        </a:rPr>
+                        <a:t>)</a:t>
+                      </a:r>
+                    </a:p>
                   </a:txBody>
                   <a:tcPr anchor="ctr">
                     <a:lnL cmpd="sng" algn="ctr" cap="flat" w="3175">
@@ -6566,6 +6637,36 @@
                       </a:r>
                       <a:endParaRPr lang="en-US" sz="1100"/>
                     </a:p>
+                    <a:p>
+                      <a:pPr algn="l"/>
+                      <a:r>
+                        <a:rPr lang="en-US" sz="1000" b="false" i="false" u="none">
+                          <a:solidFill>
+                            <a:srgbClr val="000000"/>
+                          </a:solidFill>
+                          <a:latin typeface="맑은 고딕"/>
+                        </a:rPr>
+                        <a:t>(</a:t>
+                      </a:r>
+                      <a:r>
+                        <a:rPr lang="en-US" sz="1000" b="false" i="false" u="none">
+                          <a:solidFill>
+                            <a:srgbClr val="000000"/>
+                          </a:solidFill>
+                          <a:latin typeface="맑은 고딕"/>
+                        </a:rPr>
+                        <a:t>1234-5678-3</a:t>
+                      </a:r>
+                      <a:r>
+                        <a:rPr lang="en-US" sz="1000" b="false" i="false" u="none">
+                          <a:solidFill>
+                            <a:srgbClr val="000000"/>
+                          </a:solidFill>
+                          <a:latin typeface="맑은 고딕"/>
+                        </a:rPr>
+                        <a:t>)</a:t>
+                      </a:r>
+                    </a:p>
                   </a:txBody>
                   <a:tcPr anchor="ctr">
                     <a:lnL cmpd="sng" algn="ctr" cap="flat" w="3175">
@@ -7081,6 +7182,36 @@
                       </a:r>
                       <a:endParaRPr lang="en-US" sz="1100"/>
                     </a:p>
+                    <a:p>
+                      <a:pPr algn="l"/>
+                      <a:r>
+                        <a:rPr lang="en-US" sz="1000" b="false" i="false" u="none">
+                          <a:solidFill>
+                            <a:srgbClr val="000000"/>
+                          </a:solidFill>
+                          <a:latin typeface="맑은 고딕"/>
+                        </a:rPr>
+                        <a:t>(</a:t>
+                      </a:r>
+                      <a:r>
+                        <a:rPr lang="en-US" sz="1000" b="false" i="false" u="none">
+                          <a:solidFill>
+                            <a:srgbClr val="000000"/>
+                          </a:solidFill>
+                          <a:latin typeface="맑은 고딕"/>
+                        </a:rPr>
+                        <a:t>1234-5678-4</a:t>
+                      </a:r>
+                      <a:r>
+                        <a:rPr lang="en-US" sz="1000" b="false" i="false" u="none">
+                          <a:solidFill>
+                            <a:srgbClr val="000000"/>
+                          </a:solidFill>
+                          <a:latin typeface="맑은 고딕"/>
+                        </a:rPr>
+                        <a:t>)</a:t>
+                      </a:r>
+                    </a:p>
                   </a:txBody>
                   <a:tcPr anchor="ctr">
                     <a:lnL cmpd="sng" algn="ctr" cap="flat" w="3175">
@@ -7596,6 +7727,36 @@
                       </a:r>
                       <a:endParaRPr lang="en-US" sz="1100"/>
                     </a:p>
+                    <a:p>
+                      <a:pPr algn="l"/>
+                      <a:r>
+                        <a:rPr lang="en-US" sz="1000" b="false" i="false" u="none">
+                          <a:solidFill>
+                            <a:srgbClr val="000000"/>
+                          </a:solidFill>
+                          <a:latin typeface="맑은 고딕"/>
+                        </a:rPr>
+                        <a:t>(</a:t>
+                      </a:r>
+                      <a:r>
+                        <a:rPr lang="en-US" sz="1000" b="false" i="false" u="none">
+                          <a:solidFill>
+                            <a:srgbClr val="000000"/>
+                          </a:solidFill>
+                          <a:latin typeface="맑은 고딕"/>
+                        </a:rPr>
+                        <a:t>1234-5678-5</a:t>
+                      </a:r>
+                      <a:r>
+                        <a:rPr lang="en-US" sz="1000" b="false" i="false" u="none">
+                          <a:solidFill>
+                            <a:srgbClr val="000000"/>
+                          </a:solidFill>
+                          <a:latin typeface="맑은 고딕"/>
+                        </a:rPr>
+                        <a:t>)</a:t>
+                      </a:r>
+                    </a:p>
                   </a:txBody>
                   <a:tcPr anchor="ctr">
                     <a:lnL cmpd="sng" algn="ctr" cap="flat" w="3175">
@@ -8110,6 +8271,36 @@
                         <a:t>TEST CAD NAME 6</a:t>
                       </a:r>
                       <a:endParaRPr lang="en-US" sz="1100"/>
+                    </a:p>
+                    <a:p>
+                      <a:pPr algn="l"/>
+                      <a:r>
+                        <a:rPr lang="en-US" sz="1000" b="false" i="false" u="none">
+                          <a:solidFill>
+                            <a:srgbClr val="000000"/>
+                          </a:solidFill>
+                          <a:latin typeface="맑은 고딕"/>
+                        </a:rPr>
+                        <a:t>(</a:t>
+                      </a:r>
+                      <a:r>
+                        <a:rPr lang="en-US" sz="1000" b="false" i="false" u="none">
+                          <a:solidFill>
+                            <a:srgbClr val="000000"/>
+                          </a:solidFill>
+                          <a:latin typeface="맑은 고딕"/>
+                        </a:rPr>
+                        <a:t>1234-5678-6</a:t>
+                      </a:r>
+                      <a:r>
+                        <a:rPr lang="en-US" sz="1000" b="false" i="false" u="none">
+                          <a:solidFill>
+                            <a:srgbClr val="000000"/>
+                          </a:solidFill>
+                          <a:latin typeface="맑은 고딕"/>
+                        </a:rPr>
+                        <a:t>)</a:t>
+                      </a:r>
                     </a:p>
                   </a:txBody>
                   <a:tcPr anchor="ctr">
@@ -10323,9 +10514,349 @@
           <a:p>
             <a:fld id="{8A7E836E-D787-4EBB-9550-1C3A6D242751}" type="datetime1">
               <a:rPr altLang="en-US" lang="ko-KR" smtClean="0"/>
-              <a:t>2017-12-16</a:t>
+              <a:t>2018-03-24</a:t>
             </a:fld>
             <a:endParaRPr altLang="en-US" dirty="0" lang="ko-KR"/>
+          </a:p>
+        </p:txBody>
+      </p:sp>
+      <p:sp>
+        <p:nvSpPr>
+          <p:cNvPr id="7" name="soften:BasicInfo:직사각형">
+            <a:extLst>
+              <a:ext uri="{FF2B5EF4-FFF2-40B4-BE49-F238E27FC236}">
+                <a16:creationId xmlns:a16="http://schemas.microsoft.com/office/drawing/2014/main" id="{A173C95B-4CD1-4CC9-B095-7B6BD1BFA7F7}"/>
+              </a:ext>
+            </a:extLst>
+          </p:cNvPr>
+          <p:cNvSpPr/>
+          <p:nvPr/>
+        </p:nvSpPr>
+        <p:spPr>
+          <a:xfrm>
+            <a:off x="2009775" y="3752850"/>
+            <a:ext cx="4181710" cy="523875"/>
+          </a:xfrm>
+          <a:prstGeom prst="rect">
+            <a:avLst/>
+          </a:prstGeom>
+        </p:spPr>
+        <p:style>
+          <a:lnRef idx="1">
+            <a:schemeClr val="accent5"/>
+          </a:lnRef>
+          <a:fillRef idx="2">
+            <a:schemeClr val="accent5"/>
+          </a:fillRef>
+          <a:effectRef idx="1">
+            <a:schemeClr val="accent5"/>
+          </a:effectRef>
+          <a:fontRef idx="minor">
+            <a:schemeClr val="dk1"/>
+          </a:fontRef>
+        </p:style>
+        <p:txBody>
+          <a:bodyPr anchor="ctr" rtlCol="0"/>
+          <a:lstStyle/>
+          <a:p>
+            <a:pPr algn="ctr"/>
+            <a:r>
+              <a:rPr altLang="ko-KR" dirty="0" err="1" lang="en-US"/>
+              <a:t>Softenware Test</a:t>
+            </a:r>
+            <a:endParaRPr altLang="en-US" dirty="0" lang="ko-KR"/>
+          </a:p>
+        </p:txBody>
+      </p:sp>
+      <p:sp>
+        <p:nvSpPr>
+          <p:cNvPr id="8" name="soften:BasicInfo:직사각형">
+            <a:extLst>
+              <a:ext uri="{FF2B5EF4-FFF2-40B4-BE49-F238E27FC236}">
+                <a16:creationId xmlns:a16="http://schemas.microsoft.com/office/drawing/2014/main" id="{27D522A4-ACAD-40CA-B887-196DC6C00750}"/>
+              </a:ext>
+            </a:extLst>
+          </p:cNvPr>
+          <p:cNvSpPr/>
+          <p:nvPr/>
+        </p:nvSpPr>
+        <p:spPr>
+          <a:xfrm>
+            <a:off x="2009775" y="4276725"/>
+            <a:ext cx="836342" cy="523875"/>
+          </a:xfrm>
+          <a:prstGeom prst="rect">
+            <a:avLst/>
+          </a:prstGeom>
+        </p:spPr>
+        <p:style>
+          <a:lnRef idx="1">
+            <a:schemeClr val="accent5"/>
+          </a:lnRef>
+          <a:fillRef idx="2">
+            <a:schemeClr val="accent5"/>
+          </a:fillRef>
+          <a:effectRef idx="1">
+            <a:schemeClr val="accent5"/>
+          </a:effectRef>
+          <a:fontRef idx="minor">
+            <a:schemeClr val="dk1"/>
+          </a:fontRef>
+        </p:style>
+        <p:txBody>
+          <a:bodyPr anchor="ctr" rtlCol="0" wrap="none"/>
+          <a:lstStyle/>
+          <a:p>
+            <a:pPr algn="ctr"/>
+            <a:r>
+              <a:rPr altLang="ko-KR" dirty="0" err="1" lang="en-US" sz="1000"/>
+              <a:t>2017-12-19</a:t>
+            </a:r>
+            <a:endParaRPr altLang="en-US" dirty="0" lang="ko-KR" sz="1000"/>
+          </a:p>
+        </p:txBody>
+      </p:sp>
+      <p:sp>
+        <p:nvSpPr>
+          <p:cNvPr id="9" name="soften:BasicInfo:직사각형">
+            <a:extLst>
+              <a:ext uri="{FF2B5EF4-FFF2-40B4-BE49-F238E27FC236}">
+                <a16:creationId xmlns:a16="http://schemas.microsoft.com/office/drawing/2014/main" id="{F7D68225-1378-4852-B3A9-9D8CBDE89A44}"/>
+              </a:ext>
+            </a:extLst>
+          </p:cNvPr>
+          <p:cNvSpPr/>
+          <p:nvPr/>
+        </p:nvSpPr>
+        <p:spPr>
+          <a:xfrm>
+            <a:off x="2846117" y="4276725"/>
+            <a:ext cx="836342" cy="523875"/>
+          </a:xfrm>
+          <a:prstGeom prst="rect">
+            <a:avLst/>
+          </a:prstGeom>
+        </p:spPr>
+        <p:style>
+          <a:lnRef idx="1">
+            <a:schemeClr val="accent5"/>
+          </a:lnRef>
+          <a:fillRef idx="2">
+            <a:schemeClr val="accent5"/>
+          </a:fillRef>
+          <a:effectRef idx="1">
+            <a:schemeClr val="accent5"/>
+          </a:effectRef>
+          <a:fontRef idx="minor">
+            <a:schemeClr val="dk1"/>
+          </a:fontRef>
+        </p:style>
+        <p:txBody>
+          <a:bodyPr anchor="ctr" rtlCol="0" wrap="none"/>
+          <a:lstStyle/>
+          <a:p>
+            <a:pPr algn="ctr"/>
+            <a:r>
+              <a:rPr altLang="ko-KR" dirty="0" err="1" lang="en-US" sz="1000"/>
+              <a:t>2017-12-19</a:t>
+            </a:r>
+            <a:endParaRPr altLang="en-US" dirty="0" lang="ko-KR" sz="1000"/>
+          </a:p>
+        </p:txBody>
+      </p:sp>
+      <p:sp>
+        <p:nvSpPr>
+          <p:cNvPr id="11" name="soften:BasicInfo:직사각형">
+            <a:extLst>
+              <a:ext uri="{FF2B5EF4-FFF2-40B4-BE49-F238E27FC236}">
+                <a16:creationId xmlns:a16="http://schemas.microsoft.com/office/drawing/2014/main" id="{B0A4CF92-C447-408A-A4B2-28BE175B0AB9}"/>
+              </a:ext>
+            </a:extLst>
+          </p:cNvPr>
+          <p:cNvSpPr/>
+          <p:nvPr/>
+        </p:nvSpPr>
+        <p:spPr>
+          <a:xfrm>
+            <a:off x="3682459" y="4276725"/>
+            <a:ext cx="836342" cy="523875"/>
+          </a:xfrm>
+          <a:prstGeom prst="rect">
+            <a:avLst/>
+          </a:prstGeom>
+        </p:spPr>
+        <p:style>
+          <a:lnRef idx="1">
+            <a:schemeClr val="accent5"/>
+          </a:lnRef>
+          <a:fillRef idx="2">
+            <a:schemeClr val="accent5"/>
+          </a:fillRef>
+          <a:effectRef idx="1">
+            <a:schemeClr val="accent5"/>
+          </a:effectRef>
+          <a:fontRef idx="minor">
+            <a:schemeClr val="dk1"/>
+          </a:fontRef>
+        </p:style>
+        <p:txBody>
+          <a:bodyPr anchor="ctr" rtlCol="0" wrap="none"/>
+          <a:lstStyle/>
+          <a:p>
+            <a:pPr algn="ctr"/>
+            <a:r>
+              <a:rPr altLang="ko-KR" dirty="0" err="1" lang="en-US" sz="1000"/>
+              <a:t>2017-12-19</a:t>
+            </a:r>
+            <a:endParaRPr altLang="en-US" dirty="0" lang="ko-KR" sz="1000"/>
+          </a:p>
+        </p:txBody>
+      </p:sp>
+      <p:sp>
+        <p:nvSpPr>
+          <p:cNvPr id="12" name="soften:BasicInfo:직사각형">
+            <a:extLst>
+              <a:ext uri="{FF2B5EF4-FFF2-40B4-BE49-F238E27FC236}">
+                <a16:creationId xmlns:a16="http://schemas.microsoft.com/office/drawing/2014/main" id="{DFBEE50F-4DA8-4E54-91F1-F217466CF001}"/>
+              </a:ext>
+            </a:extLst>
+          </p:cNvPr>
+          <p:cNvSpPr/>
+          <p:nvPr/>
+        </p:nvSpPr>
+        <p:spPr>
+          <a:xfrm>
+            <a:off x="4518801" y="4276725"/>
+            <a:ext cx="836342" cy="523875"/>
+          </a:xfrm>
+          <a:prstGeom prst="rect">
+            <a:avLst/>
+          </a:prstGeom>
+        </p:spPr>
+        <p:style>
+          <a:lnRef idx="1">
+            <a:schemeClr val="accent5"/>
+          </a:lnRef>
+          <a:fillRef idx="2">
+            <a:schemeClr val="accent5"/>
+          </a:fillRef>
+          <a:effectRef idx="1">
+            <a:schemeClr val="accent5"/>
+          </a:effectRef>
+          <a:fontRef idx="minor">
+            <a:schemeClr val="dk1"/>
+          </a:fontRef>
+        </p:style>
+        <p:txBody>
+          <a:bodyPr anchor="ctr" rtlCol="0" wrap="none"/>
+          <a:lstStyle/>
+          <a:p>
+            <a:pPr algn="ctr"/>
+            <a:r>
+              <a:rPr altLang="ko-KR" dirty="0" err="1" lang="en-US" sz="1000"/>
+              <a:t>2017-12-19</a:t>
+            </a:r>
+            <a:endParaRPr altLang="en-US" dirty="0" lang="ko-KR" sz="1000"/>
+          </a:p>
+        </p:txBody>
+      </p:sp>
+      <p:sp>
+        <p:nvSpPr>
+          <p:cNvPr id="13" name="soften:BasicInfo:직사각형">
+            <a:extLst>
+              <a:ext uri="{FF2B5EF4-FFF2-40B4-BE49-F238E27FC236}">
+                <a16:creationId xmlns:a16="http://schemas.microsoft.com/office/drawing/2014/main" id="{7AC18D24-A53F-45FC-AB49-F4AD15E5AAF9}"/>
+              </a:ext>
+            </a:extLst>
+          </p:cNvPr>
+          <p:cNvSpPr/>
+          <p:nvPr/>
+        </p:nvSpPr>
+        <p:spPr>
+          <a:xfrm>
+            <a:off x="5355143" y="4276725"/>
+            <a:ext cx="836342" cy="523875"/>
+          </a:xfrm>
+          <a:prstGeom prst="rect">
+            <a:avLst/>
+          </a:prstGeom>
+        </p:spPr>
+        <p:style>
+          <a:lnRef idx="1">
+            <a:schemeClr val="accent5"/>
+          </a:lnRef>
+          <a:fillRef idx="2">
+            <a:schemeClr val="accent5"/>
+          </a:fillRef>
+          <a:effectRef idx="1">
+            <a:schemeClr val="accent5"/>
+          </a:effectRef>
+          <a:fontRef idx="minor">
+            <a:schemeClr val="dk1"/>
+          </a:fontRef>
+        </p:style>
+        <p:txBody>
+          <a:bodyPr anchor="ctr" rtlCol="0" wrap="none"/>
+          <a:lstStyle/>
+          <a:p>
+            <a:pPr algn="ctr"/>
+            <a:r>
+              <a:rPr altLang="ko-KR" dirty="0" err="1" lang="en-US" sz="1000"/>
+              <a:t>2017-12-19</a:t>
+            </a:r>
+            <a:endParaRPr altLang="en-US" dirty="0" lang="ko-KR" sz="1000"/>
+          </a:p>
+        </p:txBody>
+      </p:sp>
+      <p:sp>
+        <p:nvSpPr>
+          <p:cNvPr id="14" name="soften:BasicInfo:별">
+            <a:extLst>
+              <a:ext uri="{FF2B5EF4-FFF2-40B4-BE49-F238E27FC236}">
+                <a16:creationId xmlns:a16="http://schemas.microsoft.com/office/drawing/2014/main" id="{2348C520-DE5F-49F3-B3AD-0AE24EBD7018}"/>
+              </a:ext>
+            </a:extLst>
+          </p:cNvPr>
+          <p:cNvSpPr/>
+          <p:nvPr/>
+        </p:nvSpPr>
+        <p:spPr>
+          <a:xfrm>
+            <a:off x="945993" y="3752850"/>
+            <a:ext cx="1063782" cy="1041480"/>
+          </a:xfrm>
+          <a:prstGeom prst="star5">
+            <a:avLst>
+              <a:gd fmla="val 28783" name="adj"/>
+              <a:gd fmla="val 105146" name="hf"/>
+              <a:gd fmla="val 110557" name="vf"/>
+            </a:avLst>
+          </a:prstGeom>
+        </p:spPr>
+        <p:style>
+          <a:lnRef idx="1">
+            <a:schemeClr val="accent2"/>
+          </a:lnRef>
+          <a:fillRef idx="2">
+            <a:schemeClr val="accent2"/>
+          </a:fillRef>
+          <a:effectRef idx="1">
+            <a:schemeClr val="accent2"/>
+          </a:effectRef>
+          <a:fontRef idx="minor">
+            <a:schemeClr val="dk1"/>
+          </a:fontRef>
+        </p:style>
+        <p:txBody>
+          <a:bodyPr anchor="ctr" rtlCol="0" wrap="none"/>
+          <a:lstStyle/>
+          <a:p>
+            <a:pPr algn="ctr"/>
+            <a:r>
+              <a:rPr altLang="ko-KR" dirty="0" err="1" lang="en-US" sz="1000"/>
+              <a:t>2017-12-19</a:t>
+            </a:r>
+            <a:endParaRPr altLang="en-US" dirty="0" lang="ko-KR" sz="1000"/>
           </a:p>
         </p:txBody>
       </p:sp>
@@ -10425,7 +10956,7 @@
           <p:nvPr>
             <p:extLst>
               <p:ext uri="{D42A27DB-BD31-4B8C-83A1-F6EECF244321}">
-                <p14:modId xmlns:p14="http://schemas.microsoft.com/office/powerpoint/2010/main" val="2439259899"/>
+                <p14:modId xmlns:p14="http://schemas.microsoft.com/office/powerpoint/2010/main" val="2144775211"/>
               </p:ext>
             </p:extLst>
           </p:nvPr>
@@ -11765,6 +12296,21 @@
                         <a:rPr altLang="ko-KR" dirty="0" err="1" lang="en-US" sz="1000"/>
                         <a:t>TEST CAD NAME 7</a:t>
                       </a:r>
+                    </a:p>
+                    <a:p>
+                      <a:pPr algn="l" latinLnBrk="1"/>
+                      <a:r>
+                        <a:rPr altLang="ko-KR" dirty="0" lang="en-US" sz="1000"/>
+                        <a:t>(</a:t>
+                      </a:r>
+                      <a:r>
+                        <a:rPr altLang="ko-KR" dirty="0" err="1" lang="en-US" sz="1000"/>
+                        <a:t>1234-5678-7</a:t>
+                      </a:r>
+                      <a:r>
+                        <a:rPr altLang="ko-KR" dirty="0" lang="en-US" sz="1000"/>
+                        <a:t>)</a:t>
+                      </a:r>
                       <a:endParaRPr altLang="en-US" dirty="0" lang="ko-KR" sz="1000"/>
                     </a:p>
                   </a:txBody>
@@ -12341,6 +12887,36 @@
                       </a:r>
                       <a:endParaRPr lang="en-US" sz="1100"/>
                     </a:p>
+                    <a:p>
+                      <a:pPr algn="l"/>
+                      <a:r>
+                        <a:rPr lang="en-US" sz="1000" b="false" i="false" u="none">
+                          <a:solidFill>
+                            <a:srgbClr val="000000"/>
+                          </a:solidFill>
+                          <a:latin typeface="맑은 고딕"/>
+                        </a:rPr>
+                        <a:t>(</a:t>
+                      </a:r>
+                      <a:r>
+                        <a:rPr lang="en-US" sz="1000" b="false" i="false" u="none">
+                          <a:solidFill>
+                            <a:srgbClr val="000000"/>
+                          </a:solidFill>
+                          <a:latin typeface="맑은 고딕"/>
+                        </a:rPr>
+                        <a:t>1234-5678-8</a:t>
+                      </a:r>
+                      <a:r>
+                        <a:rPr lang="en-US" sz="1000" b="false" i="false" u="none">
+                          <a:solidFill>
+                            <a:srgbClr val="000000"/>
+                          </a:solidFill>
+                          <a:latin typeface="맑은 고딕"/>
+                        </a:rPr>
+                        <a:t>)</a:t>
+                      </a:r>
+                    </a:p>
                   </a:txBody>
                   <a:tcPr anchor="ctr">
                     <a:lnL cmpd="sng" algn="ctr" cap="flat" w="3175">
@@ -12855,6 +13431,36 @@
                         <a:t>TEST CAD NAME 9</a:t>
                       </a:r>
                       <a:endParaRPr lang="en-US" sz="1100"/>
+                    </a:p>
+                    <a:p>
+                      <a:pPr algn="l"/>
+                      <a:r>
+                        <a:rPr lang="en-US" sz="1000" b="false" i="false" u="none">
+                          <a:solidFill>
+                            <a:srgbClr val="000000"/>
+                          </a:solidFill>
+                          <a:latin typeface="맑은 고딕"/>
+                        </a:rPr>
+                        <a:t>(</a:t>
+                      </a:r>
+                      <a:r>
+                        <a:rPr lang="en-US" sz="1000" b="false" i="false" u="none">
+                          <a:solidFill>
+                            <a:srgbClr val="000000"/>
+                          </a:solidFill>
+                          <a:latin typeface="맑은 고딕"/>
+                        </a:rPr>
+                        <a:t>1234-5678-9</a:t>
+                      </a:r>
+                      <a:r>
+                        <a:rPr lang="en-US" sz="1000" b="false" i="false" u="none">
+                          <a:solidFill>
+                            <a:srgbClr val="000000"/>
+                          </a:solidFill>
+                          <a:latin typeface="맑은 고딕"/>
+                        </a:rPr>
+                        <a:t>)</a:t>
+                      </a:r>
                     </a:p>
                   </a:txBody>
                   <a:tcPr anchor="ctr">
@@ -13266,7 +13872,7 @@
           <a:p>
             <a:fld id="{22BA76F6-82A9-4FF5-A42C-0B628D074EAE}" type="datetime1">
               <a:rPr altLang="en-US" lang="ko-KR" smtClean="0"/>
-              <a:t>2017-12-16</a:t>
+              <a:t>2018-03-24</a:t>
             </a:fld>
             <a:endParaRPr altLang="en-US" dirty="0" lang="ko-KR"/>
           </a:p>

</xml_diff>